<commit_message>
updating slides and schedule page
</commit_message>
<xml_diff>
--- a/ClassMaterials/EventBasedProgramming/Slides/EventBasedProgramming.pptx
+++ b/ClassMaterials/EventBasedProgramming/Slides/EventBasedProgramming.pptx
@@ -299,7 +299,7 @@
               <a:pPr>
                 <a:defRPr/>
               </a:pPr>
-              <a:t>4/5/2018</a:t>
+              <a:t>1/15/2020</a:t>
             </a:fld>
             <a:endParaRPr lang="en-US"/>
           </a:p>
@@ -534,7 +534,7 @@
               <a:pPr>
                 <a:defRPr/>
               </a:pPr>
-              <a:t>4/5/2018</a:t>
+              <a:t>1/15/2020</a:t>
             </a:fld>
             <a:endParaRPr lang="en-US"/>
           </a:p>
@@ -919,7 +919,7 @@
           </a:ln>
           <a:extLst>
             <a:ext uri="{909E8E84-426E-40dd-AFC4-6F175D3DCCD1}">
-              <a14:hiddenFill xmlns="" xmlns:a14="http://schemas.microsoft.com/office/drawing/2010/main">
+              <a14:hiddenFill xmlns:a14="http://schemas.microsoft.com/office/drawing/2010/main" xmlns="">
                 <a:solidFill>
                   <a:srgbClr val="FFFFFF"/>
                 </a:solidFill>
@@ -943,14 +943,14 @@
           <a:ln/>
           <a:extLst>
             <a:ext uri="{909E8E84-426E-40dd-AFC4-6F175D3DCCD1}">
-              <a14:hiddenFill xmlns="" xmlns:a14="http://schemas.microsoft.com/office/drawing/2010/main">
+              <a14:hiddenFill xmlns:a14="http://schemas.microsoft.com/office/drawing/2010/main" xmlns="">
                 <a:solidFill>
                   <a:srgbClr val="FFFFFF"/>
                 </a:solidFill>
               </a14:hiddenFill>
             </a:ext>
             <a:ext uri="{91240B29-F687-4f45-9708-019B960494DF}">
-              <a14:hiddenLine xmlns="" xmlns:a14="http://schemas.microsoft.com/office/drawing/2010/main" w="9525">
+              <a14:hiddenLine xmlns:a14="http://schemas.microsoft.com/office/drawing/2010/main" xmlns="" w="9525">
                 <a:solidFill>
                   <a:srgbClr val="000000"/>
                 </a:solidFill>
@@ -1031,14 +1031,14 @@
           <a:ln/>
           <a:extLst>
             <a:ext uri="{909E8E84-426E-40dd-AFC4-6F175D3DCCD1}">
-              <a14:hiddenFill xmlns="" xmlns:a14="http://schemas.microsoft.com/office/drawing/2010/main">
+              <a14:hiddenFill xmlns:a14="http://schemas.microsoft.com/office/drawing/2010/main" xmlns="">
                 <a:solidFill>
                   <a:srgbClr val="FFFFFF"/>
                 </a:solidFill>
               </a14:hiddenFill>
             </a:ext>
             <a:ext uri="{91240B29-F687-4f45-9708-019B960494DF}">
-              <a14:hiddenLine xmlns="" xmlns:a14="http://schemas.microsoft.com/office/drawing/2010/main" w="9525">
+              <a14:hiddenLine xmlns:a14="http://schemas.microsoft.com/office/drawing/2010/main" xmlns="" w="9525">
                 <a:solidFill>
                   <a:srgbClr val="000000"/>
                 </a:solidFill>
@@ -1225,7 +1225,7 @@
           </a:ln>
           <a:extLst>
             <a:ext uri="{909E8E84-426E-40dd-AFC4-6F175D3DCCD1}">
-              <a14:hiddenFill xmlns="" xmlns:a14="http://schemas.microsoft.com/office/drawing/2010/main">
+              <a14:hiddenFill xmlns:a14="http://schemas.microsoft.com/office/drawing/2010/main" xmlns="">
                 <a:solidFill>
                   <a:srgbClr val="FFFFFF"/>
                 </a:solidFill>
@@ -1249,14 +1249,14 @@
           <a:ln/>
           <a:extLst>
             <a:ext uri="{909E8E84-426E-40dd-AFC4-6F175D3DCCD1}">
-              <a14:hiddenFill xmlns="" xmlns:a14="http://schemas.microsoft.com/office/drawing/2010/main">
+              <a14:hiddenFill xmlns:a14="http://schemas.microsoft.com/office/drawing/2010/main" xmlns="">
                 <a:solidFill>
                   <a:srgbClr val="FFFFFF"/>
                 </a:solidFill>
               </a14:hiddenFill>
             </a:ext>
             <a:ext uri="{91240B29-F687-4f45-9708-019B960494DF}">
-              <a14:hiddenLine xmlns="" xmlns:a14="http://schemas.microsoft.com/office/drawing/2010/main" w="9525">
+              <a14:hiddenLine xmlns:a14="http://schemas.microsoft.com/office/drawing/2010/main" xmlns="" w="9525">
                 <a:solidFill>
                   <a:srgbClr val="000000"/>
                 </a:solidFill>
@@ -1273,13 +1273,8 @@
           <a:p>
             <a:r>
               <a:rPr lang="en-US" b="1" dirty="0" smtClean="0"/>
-              <a:t>DRAW N,S,E,W,CENTER on </a:t>
-            </a:r>
-            <a:r>
-              <a:rPr lang="en-US" b="1" dirty="0" smtClean="0"/>
-              <a:t>board or use next slide</a:t>
-            </a:r>
-            <a:endParaRPr lang="en-US" b="1" dirty="0" smtClean="0"/>
+              <a:t>DRAW N,S,E,W,CENTER on board or use next slide</a:t>
+            </a:r>
           </a:p>
           <a:p>
             <a:r>
@@ -1390,14 +1385,14 @@
           <a:ln/>
           <a:extLst>
             <a:ext uri="{909E8E84-426E-40dd-AFC4-6F175D3DCCD1}">
-              <a14:hiddenFill xmlns="" xmlns:a14="http://schemas.microsoft.com/office/drawing/2010/main">
+              <a14:hiddenFill xmlns:a14="http://schemas.microsoft.com/office/drawing/2010/main" xmlns="">
                 <a:solidFill>
                   <a:srgbClr val="FFFFFF"/>
                 </a:solidFill>
               </a14:hiddenFill>
             </a:ext>
             <a:ext uri="{91240B29-F687-4f45-9708-019B960494DF}">
-              <a14:hiddenLine xmlns="" xmlns:a14="http://schemas.microsoft.com/office/drawing/2010/main" w="9525">
+              <a14:hiddenLine xmlns:a14="http://schemas.microsoft.com/office/drawing/2010/main" xmlns="" w="9525">
                 <a:solidFill>
                   <a:srgbClr val="000000"/>
                 </a:solidFill>
@@ -1674,7 +1669,7 @@
           </a:ln>
           <a:extLst>
             <a:ext uri="{909E8E84-426E-40dd-AFC4-6F175D3DCCD1}">
-              <a14:hiddenFill xmlns="" xmlns:a14="http://schemas.microsoft.com/office/drawing/2010/main">
+              <a14:hiddenFill xmlns:a14="http://schemas.microsoft.com/office/drawing/2010/main" xmlns="">
                 <a:solidFill>
                   <a:srgbClr val="FFFFFF"/>
                 </a:solidFill>
@@ -1698,14 +1693,14 @@
           <a:ln/>
           <a:extLst>
             <a:ext uri="{909E8E84-426E-40dd-AFC4-6F175D3DCCD1}">
-              <a14:hiddenFill xmlns="" xmlns:a14="http://schemas.microsoft.com/office/drawing/2010/main">
+              <a14:hiddenFill xmlns:a14="http://schemas.microsoft.com/office/drawing/2010/main" xmlns="">
                 <a:solidFill>
                   <a:srgbClr val="FFFFFF"/>
                 </a:solidFill>
               </a14:hiddenFill>
             </a:ext>
             <a:ext uri="{91240B29-F687-4f45-9708-019B960494DF}">
-              <a14:hiddenLine xmlns="" xmlns:a14="http://schemas.microsoft.com/office/drawing/2010/main" w="9525">
+              <a14:hiddenLine xmlns:a14="http://schemas.microsoft.com/office/drawing/2010/main" xmlns="" w="9525">
                 <a:solidFill>
                   <a:srgbClr val="000000"/>
                 </a:solidFill>
@@ -1828,14 +1823,14 @@
           <a:ln/>
           <a:extLst>
             <a:ext uri="{909E8E84-426E-40dd-AFC4-6F175D3DCCD1}">
-              <a14:hiddenFill xmlns="" xmlns:a14="http://schemas.microsoft.com/office/drawing/2010/main">
+              <a14:hiddenFill xmlns:a14="http://schemas.microsoft.com/office/drawing/2010/main" xmlns="">
                 <a:solidFill>
                   <a:srgbClr val="FFFFFF"/>
                 </a:solidFill>
               </a14:hiddenFill>
             </a:ext>
             <a:ext uri="{91240B29-F687-4f45-9708-019B960494DF}">
-              <a14:hiddenLine xmlns="" xmlns:a14="http://schemas.microsoft.com/office/drawing/2010/main" w="9525">
+              <a14:hiddenLine xmlns:a14="http://schemas.microsoft.com/office/drawing/2010/main" xmlns="" w="9525">
                 <a:solidFill>
                   <a:srgbClr val="000000"/>
                 </a:solidFill>
@@ -2022,7 +2017,7 @@
           </a:ln>
           <a:extLst>
             <a:ext uri="{909E8E84-426E-40dd-AFC4-6F175D3DCCD1}">
-              <a14:hiddenFill xmlns="" xmlns:a14="http://schemas.microsoft.com/office/drawing/2010/main">
+              <a14:hiddenFill xmlns:a14="http://schemas.microsoft.com/office/drawing/2010/main" xmlns="">
                 <a:solidFill>
                   <a:srgbClr val="FFFFFF"/>
                 </a:solidFill>
@@ -2046,14 +2041,14 @@
           <a:ln/>
           <a:extLst>
             <a:ext uri="{909E8E84-426E-40dd-AFC4-6F175D3DCCD1}">
-              <a14:hiddenFill xmlns="" xmlns:a14="http://schemas.microsoft.com/office/drawing/2010/main">
+              <a14:hiddenFill xmlns:a14="http://schemas.microsoft.com/office/drawing/2010/main" xmlns="">
                 <a:solidFill>
                   <a:srgbClr val="FFFFFF"/>
                 </a:solidFill>
               </a14:hiddenFill>
             </a:ext>
             <a:ext uri="{91240B29-F687-4f45-9708-019B960494DF}">
-              <a14:hiddenLine xmlns="" xmlns:a14="http://schemas.microsoft.com/office/drawing/2010/main" w="9525">
+              <a14:hiddenLine xmlns:a14="http://schemas.microsoft.com/office/drawing/2010/main" xmlns="" w="9525">
                 <a:solidFill>
                   <a:srgbClr val="000000"/>
                 </a:solidFill>
@@ -2096,14 +2091,14 @@
           <a:ln/>
           <a:extLst>
             <a:ext uri="{909E8E84-426E-40dd-AFC4-6F175D3DCCD1}">
-              <a14:hiddenFill xmlns="" xmlns:a14="http://schemas.microsoft.com/office/drawing/2010/main">
+              <a14:hiddenFill xmlns:a14="http://schemas.microsoft.com/office/drawing/2010/main" xmlns="">
                 <a:solidFill>
                   <a:srgbClr val="FFFFFF"/>
                 </a:solidFill>
               </a14:hiddenFill>
             </a:ext>
             <a:ext uri="{91240B29-F687-4f45-9708-019B960494DF}">
-              <a14:hiddenLine xmlns="" xmlns:a14="http://schemas.microsoft.com/office/drawing/2010/main" w="9525">
+              <a14:hiddenLine xmlns:a14="http://schemas.microsoft.com/office/drawing/2010/main" xmlns="" w="9525">
                 <a:solidFill>
                   <a:srgbClr val="000000"/>
                 </a:solidFill>
@@ -2290,7 +2285,7 @@
           </a:ln>
           <a:extLst>
             <a:ext uri="{909E8E84-426E-40dd-AFC4-6F175D3DCCD1}">
-              <a14:hiddenFill xmlns="" xmlns:a14="http://schemas.microsoft.com/office/drawing/2010/main">
+              <a14:hiddenFill xmlns:a14="http://schemas.microsoft.com/office/drawing/2010/main" xmlns="">
                 <a:solidFill>
                   <a:srgbClr val="FFFFFF"/>
                 </a:solidFill>
@@ -2314,14 +2309,14 @@
           <a:ln/>
           <a:extLst>
             <a:ext uri="{909E8E84-426E-40dd-AFC4-6F175D3DCCD1}">
-              <a14:hiddenFill xmlns="" xmlns:a14="http://schemas.microsoft.com/office/drawing/2010/main">
+              <a14:hiddenFill xmlns:a14="http://schemas.microsoft.com/office/drawing/2010/main" xmlns="">
                 <a:solidFill>
                   <a:srgbClr val="FFFFFF"/>
                 </a:solidFill>
               </a14:hiddenFill>
             </a:ext>
             <a:ext uri="{91240B29-F687-4f45-9708-019B960494DF}">
-              <a14:hiddenLine xmlns="" xmlns:a14="http://schemas.microsoft.com/office/drawing/2010/main" w="9525">
+              <a14:hiddenLine xmlns:a14="http://schemas.microsoft.com/office/drawing/2010/main" xmlns="" w="9525">
                 <a:solidFill>
                   <a:srgbClr val="000000"/>
                 </a:solidFill>
@@ -2427,14 +2422,14 @@
           <a:ln/>
           <a:extLst>
             <a:ext uri="{909E8E84-426E-40dd-AFC4-6F175D3DCCD1}">
-              <a14:hiddenFill xmlns="" xmlns:a14="http://schemas.microsoft.com/office/drawing/2010/main">
+              <a14:hiddenFill xmlns:a14="http://schemas.microsoft.com/office/drawing/2010/main" xmlns="">
                 <a:solidFill>
                   <a:srgbClr val="FFFFFF"/>
                 </a:solidFill>
               </a14:hiddenFill>
             </a:ext>
             <a:ext uri="{91240B29-F687-4f45-9708-019B960494DF}">
-              <a14:hiddenLine xmlns="" xmlns:a14="http://schemas.microsoft.com/office/drawing/2010/main" w="9525">
+              <a14:hiddenLine xmlns:a14="http://schemas.microsoft.com/office/drawing/2010/main" xmlns="" w="9525">
                 <a:solidFill>
                   <a:srgbClr val="000000"/>
                 </a:solidFill>
@@ -2621,7 +2616,7 @@
           </a:ln>
           <a:extLst>
             <a:ext uri="{909E8E84-426E-40dd-AFC4-6F175D3DCCD1}">
-              <a14:hiddenFill xmlns="" xmlns:a14="http://schemas.microsoft.com/office/drawing/2010/main">
+              <a14:hiddenFill xmlns:a14="http://schemas.microsoft.com/office/drawing/2010/main" xmlns="">
                 <a:solidFill>
                   <a:srgbClr val="FFFFFF"/>
                 </a:solidFill>
@@ -2645,14 +2640,14 @@
           <a:ln/>
           <a:extLst>
             <a:ext uri="{909E8E84-426E-40dd-AFC4-6F175D3DCCD1}">
-              <a14:hiddenFill xmlns="" xmlns:a14="http://schemas.microsoft.com/office/drawing/2010/main">
+              <a14:hiddenFill xmlns:a14="http://schemas.microsoft.com/office/drawing/2010/main" xmlns="">
                 <a:solidFill>
                   <a:srgbClr val="FFFFFF"/>
                 </a:solidFill>
               </a14:hiddenFill>
             </a:ext>
             <a:ext uri="{91240B29-F687-4f45-9708-019B960494DF}">
-              <a14:hiddenLine xmlns="" xmlns:a14="http://schemas.microsoft.com/office/drawing/2010/main" w="9525">
+              <a14:hiddenLine xmlns:a14="http://schemas.microsoft.com/office/drawing/2010/main" xmlns="" w="9525">
                 <a:solidFill>
                   <a:srgbClr val="000000"/>
                 </a:solidFill>
@@ -2735,14 +2730,14 @@
           <a:ln/>
           <a:extLst>
             <a:ext uri="{909E8E84-426E-40dd-AFC4-6F175D3DCCD1}">
-              <a14:hiddenFill xmlns="" xmlns:a14="http://schemas.microsoft.com/office/drawing/2010/main">
+              <a14:hiddenFill xmlns:a14="http://schemas.microsoft.com/office/drawing/2010/main" xmlns="">
                 <a:solidFill>
                   <a:srgbClr val="FFFFFF"/>
                 </a:solidFill>
               </a14:hiddenFill>
             </a:ext>
             <a:ext uri="{91240B29-F687-4f45-9708-019B960494DF}">
-              <a14:hiddenLine xmlns="" xmlns:a14="http://schemas.microsoft.com/office/drawing/2010/main" w="9525">
+              <a14:hiddenLine xmlns:a14="http://schemas.microsoft.com/office/drawing/2010/main" xmlns="" w="9525">
                 <a:solidFill>
                   <a:srgbClr val="000000"/>
                 </a:solidFill>
@@ -2929,7 +2924,7 @@
           </a:ln>
           <a:extLst>
             <a:ext uri="{909E8E84-426E-40dd-AFC4-6F175D3DCCD1}">
-              <a14:hiddenFill xmlns="" xmlns:a14="http://schemas.microsoft.com/office/drawing/2010/main">
+              <a14:hiddenFill xmlns:a14="http://schemas.microsoft.com/office/drawing/2010/main" xmlns="">
                 <a:solidFill>
                   <a:srgbClr val="FFFFFF"/>
                 </a:solidFill>
@@ -2953,14 +2948,14 @@
           <a:ln/>
           <a:extLst>
             <a:ext uri="{909E8E84-426E-40dd-AFC4-6F175D3DCCD1}">
-              <a14:hiddenFill xmlns="" xmlns:a14="http://schemas.microsoft.com/office/drawing/2010/main">
+              <a14:hiddenFill xmlns:a14="http://schemas.microsoft.com/office/drawing/2010/main" xmlns="">
                 <a:solidFill>
                   <a:srgbClr val="FFFFFF"/>
                 </a:solidFill>
               </a14:hiddenFill>
             </a:ext>
             <a:ext uri="{91240B29-F687-4f45-9708-019B960494DF}">
-              <a14:hiddenLine xmlns="" xmlns:a14="http://schemas.microsoft.com/office/drawing/2010/main" w="9525">
+              <a14:hiddenLine xmlns:a14="http://schemas.microsoft.com/office/drawing/2010/main" xmlns="" w="9525">
                 <a:solidFill>
                   <a:srgbClr val="000000"/>
                 </a:solidFill>
@@ -2997,14 +2992,14 @@
           <a:ln/>
           <a:extLst>
             <a:ext uri="{909E8E84-426E-40dd-AFC4-6F175D3DCCD1}">
-              <a14:hiddenFill xmlns="" xmlns:a14="http://schemas.microsoft.com/office/drawing/2010/main">
+              <a14:hiddenFill xmlns:a14="http://schemas.microsoft.com/office/drawing/2010/main" xmlns="">
                 <a:solidFill>
                   <a:srgbClr val="FFFFFF"/>
                 </a:solidFill>
               </a14:hiddenFill>
             </a:ext>
             <a:ext uri="{91240B29-F687-4f45-9708-019B960494DF}">
-              <a14:hiddenLine xmlns="" xmlns:a14="http://schemas.microsoft.com/office/drawing/2010/main" w="9525">
+              <a14:hiddenLine xmlns:a14="http://schemas.microsoft.com/office/drawing/2010/main" xmlns="" w="9525">
                 <a:solidFill>
                   <a:srgbClr val="000000"/>
                 </a:solidFill>
@@ -3191,7 +3186,7 @@
           </a:ln>
           <a:extLst>
             <a:ext uri="{909E8E84-426E-40dd-AFC4-6F175D3DCCD1}">
-              <a14:hiddenFill xmlns="" xmlns:a14="http://schemas.microsoft.com/office/drawing/2010/main">
+              <a14:hiddenFill xmlns:a14="http://schemas.microsoft.com/office/drawing/2010/main" xmlns="">
                 <a:solidFill>
                   <a:srgbClr val="FFFFFF"/>
                 </a:solidFill>
@@ -3215,14 +3210,14 @@
           <a:ln/>
           <a:extLst>
             <a:ext uri="{909E8E84-426E-40dd-AFC4-6F175D3DCCD1}">
-              <a14:hiddenFill xmlns="" xmlns:a14="http://schemas.microsoft.com/office/drawing/2010/main">
+              <a14:hiddenFill xmlns:a14="http://schemas.microsoft.com/office/drawing/2010/main" xmlns="">
                 <a:solidFill>
                   <a:srgbClr val="FFFFFF"/>
                 </a:solidFill>
               </a14:hiddenFill>
             </a:ext>
             <a:ext uri="{91240B29-F687-4f45-9708-019B960494DF}">
-              <a14:hiddenLine xmlns="" xmlns:a14="http://schemas.microsoft.com/office/drawing/2010/main" w="9525">
+              <a14:hiddenLine xmlns:a14="http://schemas.microsoft.com/office/drawing/2010/main" xmlns="" w="9525">
                 <a:solidFill>
                   <a:srgbClr val="000000"/>
                 </a:solidFill>
@@ -3275,14 +3270,14 @@
           <a:ln/>
           <a:extLst>
             <a:ext uri="{909E8E84-426E-40dd-AFC4-6F175D3DCCD1}">
-              <a14:hiddenFill xmlns="" xmlns:a14="http://schemas.microsoft.com/office/drawing/2010/main">
+              <a14:hiddenFill xmlns:a14="http://schemas.microsoft.com/office/drawing/2010/main" xmlns="">
                 <a:solidFill>
                   <a:srgbClr val="FFFFFF"/>
                 </a:solidFill>
               </a14:hiddenFill>
             </a:ext>
             <a:ext uri="{91240B29-F687-4f45-9708-019B960494DF}">
-              <a14:hiddenLine xmlns="" xmlns:a14="http://schemas.microsoft.com/office/drawing/2010/main" w="9525">
+              <a14:hiddenLine xmlns:a14="http://schemas.microsoft.com/office/drawing/2010/main" xmlns="" w="9525">
                 <a:solidFill>
                   <a:srgbClr val="000000"/>
                 </a:solidFill>
@@ -3469,7 +3464,7 @@
           </a:ln>
           <a:extLst>
             <a:ext uri="{909E8E84-426E-40dd-AFC4-6F175D3DCCD1}">
-              <a14:hiddenFill xmlns="" xmlns:a14="http://schemas.microsoft.com/office/drawing/2010/main">
+              <a14:hiddenFill xmlns:a14="http://schemas.microsoft.com/office/drawing/2010/main" xmlns="">
                 <a:solidFill>
                   <a:srgbClr val="FFFFFF"/>
                 </a:solidFill>
@@ -3493,14 +3488,14 @@
           <a:ln/>
           <a:extLst>
             <a:ext uri="{909E8E84-426E-40dd-AFC4-6F175D3DCCD1}">
-              <a14:hiddenFill xmlns="" xmlns:a14="http://schemas.microsoft.com/office/drawing/2010/main">
+              <a14:hiddenFill xmlns:a14="http://schemas.microsoft.com/office/drawing/2010/main" xmlns="">
                 <a:solidFill>
                   <a:srgbClr val="FFFFFF"/>
                 </a:solidFill>
               </a14:hiddenFill>
             </a:ext>
             <a:ext uri="{91240B29-F687-4f45-9708-019B960494DF}">
-              <a14:hiddenLine xmlns="" xmlns:a14="http://schemas.microsoft.com/office/drawing/2010/main" w="9525">
+              <a14:hiddenLine xmlns:a14="http://schemas.microsoft.com/office/drawing/2010/main" xmlns="" w="9525">
                 <a:solidFill>
                   <a:srgbClr val="000000"/>
                 </a:solidFill>
@@ -3534,14 +3529,14 @@
           <a:ln/>
           <a:extLst>
             <a:ext uri="{909E8E84-426E-40dd-AFC4-6F175D3DCCD1}">
-              <a14:hiddenFill xmlns="" xmlns:a14="http://schemas.microsoft.com/office/drawing/2010/main">
+              <a14:hiddenFill xmlns:a14="http://schemas.microsoft.com/office/drawing/2010/main" xmlns="">
                 <a:solidFill>
                   <a:srgbClr val="FFFFFF"/>
                 </a:solidFill>
               </a14:hiddenFill>
             </a:ext>
             <a:ext uri="{91240B29-F687-4f45-9708-019B960494DF}">
-              <a14:hiddenLine xmlns="" xmlns:a14="http://schemas.microsoft.com/office/drawing/2010/main" w="9525">
+              <a14:hiddenLine xmlns:a14="http://schemas.microsoft.com/office/drawing/2010/main" xmlns="" w="9525">
                 <a:solidFill>
                   <a:srgbClr val="000000"/>
                 </a:solidFill>
@@ -3958,7 +3953,7 @@
           </a:ln>
           <a:extLst>
             <a:ext uri="{909E8E84-426E-40dd-AFC4-6F175D3DCCD1}">
-              <a14:hiddenFill xmlns="" xmlns:a14="http://schemas.microsoft.com/office/drawing/2010/main">
+              <a14:hiddenFill xmlns:a14="http://schemas.microsoft.com/office/drawing/2010/main" xmlns="">
                 <a:solidFill>
                   <a:srgbClr val="FFFFFF"/>
                 </a:solidFill>
@@ -3982,14 +3977,14 @@
           <a:ln/>
           <a:extLst>
             <a:ext uri="{909E8E84-426E-40dd-AFC4-6F175D3DCCD1}">
-              <a14:hiddenFill xmlns="" xmlns:a14="http://schemas.microsoft.com/office/drawing/2010/main">
+              <a14:hiddenFill xmlns:a14="http://schemas.microsoft.com/office/drawing/2010/main" xmlns="">
                 <a:solidFill>
                   <a:srgbClr val="FFFFFF"/>
                 </a:solidFill>
               </a14:hiddenFill>
             </a:ext>
             <a:ext uri="{91240B29-F687-4f45-9708-019B960494DF}">
-              <a14:hiddenLine xmlns="" xmlns:a14="http://schemas.microsoft.com/office/drawing/2010/main" w="9525">
+              <a14:hiddenLine xmlns:a14="http://schemas.microsoft.com/office/drawing/2010/main" xmlns="" w="9525">
                 <a:solidFill>
                   <a:srgbClr val="000000"/>
                 </a:solidFill>
@@ -4065,14 +4060,14 @@
           <a:ln/>
           <a:extLst>
             <a:ext uri="{909E8E84-426E-40dd-AFC4-6F175D3DCCD1}">
-              <a14:hiddenFill xmlns="" xmlns:a14="http://schemas.microsoft.com/office/drawing/2010/main">
+              <a14:hiddenFill xmlns:a14="http://schemas.microsoft.com/office/drawing/2010/main" xmlns="">
                 <a:solidFill>
                   <a:srgbClr val="FFFFFF"/>
                 </a:solidFill>
               </a14:hiddenFill>
             </a:ext>
             <a:ext uri="{91240B29-F687-4f45-9708-019B960494DF}">
-              <a14:hiddenLine xmlns="" xmlns:a14="http://schemas.microsoft.com/office/drawing/2010/main" w="9525">
+              <a14:hiddenLine xmlns:a14="http://schemas.microsoft.com/office/drawing/2010/main" xmlns="" w="9525">
                 <a:solidFill>
                   <a:srgbClr val="000000"/>
                 </a:solidFill>
@@ -4259,7 +4254,7 @@
           </a:ln>
           <a:extLst>
             <a:ext uri="{909E8E84-426E-40dd-AFC4-6F175D3DCCD1}">
-              <a14:hiddenFill xmlns="" xmlns:a14="http://schemas.microsoft.com/office/drawing/2010/main">
+              <a14:hiddenFill xmlns:a14="http://schemas.microsoft.com/office/drawing/2010/main" xmlns="">
                 <a:solidFill>
                   <a:srgbClr val="FFFFFF"/>
                 </a:solidFill>
@@ -4283,14 +4278,14 @@
           <a:ln/>
           <a:extLst>
             <a:ext uri="{909E8E84-426E-40dd-AFC4-6F175D3DCCD1}">
-              <a14:hiddenFill xmlns="" xmlns:a14="http://schemas.microsoft.com/office/drawing/2010/main">
+              <a14:hiddenFill xmlns:a14="http://schemas.microsoft.com/office/drawing/2010/main" xmlns="">
                 <a:solidFill>
                   <a:srgbClr val="FFFFFF"/>
                 </a:solidFill>
               </a14:hiddenFill>
             </a:ext>
             <a:ext uri="{91240B29-F687-4f45-9708-019B960494DF}">
-              <a14:hiddenLine xmlns="" xmlns:a14="http://schemas.microsoft.com/office/drawing/2010/main" w="9525">
+              <a14:hiddenLine xmlns:a14="http://schemas.microsoft.com/office/drawing/2010/main" xmlns="" w="9525">
                 <a:solidFill>
                   <a:srgbClr val="000000"/>
                 </a:solidFill>
@@ -4321,11 +4316,7 @@
           <a:p>
             <a:r>
               <a:rPr lang="en-US" dirty="0" smtClean="0"/>
-              <a:t>An </a:t>
-            </a:r>
-            <a:r>
-              <a:rPr lang="en-US" dirty="0" smtClean="0"/>
-              <a:t>event source is an object that can notify other classes of events.</a:t>
+              <a:t>An event source is an object that can notify other classes of events.</a:t>
             </a:r>
           </a:p>
           <a:p>
@@ -4419,14 +4410,14 @@
           <a:ln/>
           <a:extLst>
             <a:ext uri="{909E8E84-426E-40dd-AFC4-6F175D3DCCD1}">
-              <a14:hiddenFill xmlns="" xmlns:a14="http://schemas.microsoft.com/office/drawing/2010/main">
+              <a14:hiddenFill xmlns:a14="http://schemas.microsoft.com/office/drawing/2010/main" xmlns="">
                 <a:solidFill>
                   <a:srgbClr val="FFFFFF"/>
                 </a:solidFill>
               </a14:hiddenFill>
             </a:ext>
             <a:ext uri="{91240B29-F687-4f45-9708-019B960494DF}">
-              <a14:hiddenLine xmlns="" xmlns:a14="http://schemas.microsoft.com/office/drawing/2010/main" w="9525">
+              <a14:hiddenLine xmlns:a14="http://schemas.microsoft.com/office/drawing/2010/main" xmlns="" w="9525">
                 <a:solidFill>
                   <a:srgbClr val="000000"/>
                 </a:solidFill>
@@ -4861,15 +4852,7 @@
           <a:p>
             <a:r>
               <a:rPr lang="en-US" baseline="0" dirty="0" smtClean="0"/>
-              <a:t>Might want to demo how to have the button update the frame’s title (by passing in the </a:t>
-            </a:r>
-            <a:r>
-              <a:rPr lang="en-US" baseline="0" dirty="0" smtClean="0"/>
-              <a:t>frame </a:t>
-            </a:r>
-            <a:r>
-              <a:rPr lang="en-US" baseline="0" dirty="0" smtClean="0"/>
-              <a:t>to the listener’s constructor and calling back).</a:t>
+              <a:t>Might want to demo how to have the button update the frame’s title (by passing in the frame to the listener’s constructor and calling back).</a:t>
             </a:r>
             <a:endParaRPr lang="en-US" dirty="0"/>
           </a:p>
@@ -5212,7 +5195,7 @@
               <a:pPr>
                 <a:defRPr/>
               </a:pPr>
-              <a:t>Thursday, April 5, 2018</a:t>
+              <a:t>Wednesday, January 15, 2020</a:t>
             </a:fld>
             <a:endParaRPr lang="en-US" dirty="0"/>
           </a:p>
@@ -5397,7 +5380,7 @@
               <a:pPr>
                 <a:defRPr/>
               </a:pPr>
-              <a:t>Thursday, April 5, 2018</a:t>
+              <a:t>Wednesday, January 15, 2020</a:t>
             </a:fld>
             <a:endParaRPr lang="en-US" dirty="0"/>
           </a:p>
@@ -5592,7 +5575,7 @@
               <a:pPr>
                 <a:defRPr/>
               </a:pPr>
-              <a:t>Thursday, April 5, 2018</a:t>
+              <a:t>Wednesday, January 15, 2020</a:t>
             </a:fld>
             <a:endParaRPr lang="en-US" dirty="0"/>
           </a:p>
@@ -5777,7 +5760,7 @@
               <a:pPr>
                 <a:defRPr/>
               </a:pPr>
-              <a:t>Thursday, April 5, 2018</a:t>
+              <a:t>Wednesday, January 15, 2020</a:t>
             </a:fld>
             <a:endParaRPr lang="en-US" dirty="0"/>
           </a:p>
@@ -6038,7 +6021,7 @@
               <a:pPr>
                 <a:defRPr/>
               </a:pPr>
-              <a:t>Thursday, April 5, 2018</a:t>
+              <a:t>Wednesday, January 15, 2020</a:t>
             </a:fld>
             <a:endParaRPr lang="en-US"/>
           </a:p>
@@ -6341,7 +6324,7 @@
               <a:pPr>
                 <a:defRPr/>
               </a:pPr>
-              <a:t>Thursday, April 5, 2018</a:t>
+              <a:t>Wednesday, January 15, 2020</a:t>
             </a:fld>
             <a:endParaRPr lang="en-US"/>
           </a:p>
@@ -6778,7 +6761,7 @@
               <a:pPr>
                 <a:defRPr/>
               </a:pPr>
-              <a:t>Thursday, April 5, 2018</a:t>
+              <a:t>Wednesday, January 15, 2020</a:t>
             </a:fld>
             <a:endParaRPr lang="en-US"/>
           </a:p>
@@ -6911,7 +6894,7 @@
               <a:pPr>
                 <a:defRPr/>
               </a:pPr>
-              <a:t>Thursday, April 5, 2018</a:t>
+              <a:t>Wednesday, January 15, 2020</a:t>
             </a:fld>
             <a:endParaRPr lang="en-US"/>
           </a:p>
@@ -7021,7 +7004,7 @@
               <a:pPr>
                 <a:defRPr/>
               </a:pPr>
-              <a:t>Thursday, April 5, 2018</a:t>
+              <a:t>Wednesday, January 15, 2020</a:t>
             </a:fld>
             <a:endParaRPr lang="en-US" dirty="0"/>
           </a:p>
@@ -7313,7 +7296,7 @@
               <a:pPr>
                 <a:defRPr/>
               </a:pPr>
-              <a:t>Thursday, April 5, 2018</a:t>
+              <a:t>Wednesday, January 15, 2020</a:t>
             </a:fld>
             <a:endParaRPr lang="en-US"/>
           </a:p>
@@ -7581,7 +7564,7 @@
               <a:pPr>
                 <a:defRPr/>
               </a:pPr>
-              <a:t>Thursday, April 5, 2018</a:t>
+              <a:t>Wednesday, January 15, 2020</a:t>
             </a:fld>
             <a:endParaRPr lang="en-US"/>
           </a:p>
@@ -7809,7 +7792,7 @@
               <a:pPr>
                 <a:defRPr/>
               </a:pPr>
-              <a:t>Thursday, April 5, 2018</a:t>
+              <a:t>Wednesday, January 15, 2020</a:t>
             </a:fld>
             <a:endParaRPr lang="en-US" dirty="0"/>
           </a:p>
@@ -8291,20 +8274,25 @@
             </a:pPr>
             <a:r>
               <a:rPr lang="en-US" sz="2400" dirty="0"/>
-              <a:t>Check </a:t>
-            </a:r>
-            <a:r>
-              <a:rPr lang="en-US" sz="2400"/>
-              <a:t>out </a:t>
-            </a:r>
-            <a:r>
-              <a:rPr lang="en-US" sz="2400" i="1" smtClean="0"/>
-              <a:t>EventBasedProgramming </a:t>
+              <a:t>Check out </a:t>
+            </a:r>
+            <a:r>
+              <a:rPr lang="en-US" sz="2400" i="1" dirty="0" err="1" smtClean="0"/>
+              <a:t>EventBasedProgramming</a:t>
+            </a:r>
+            <a:r>
+              <a:rPr lang="en-US" sz="2400" i="1" dirty="0" smtClean="0"/>
+              <a:t> </a:t>
             </a:r>
             <a:r>
               <a:rPr lang="en-US" sz="2400" dirty="0"/>
-              <a:t>from SVN</a:t>
-            </a:r>
+              <a:t>from </a:t>
+            </a:r>
+            <a:r>
+              <a:rPr lang="en-US" sz="2400" dirty="0" err="1" smtClean="0"/>
+              <a:t>Git</a:t>
+            </a:r>
+            <a:endParaRPr lang="en-US" sz="2400" dirty="0"/>
           </a:p>
         </p:txBody>
       </p:sp>
@@ -13439,14 +13427,14 @@
           </a:ln>
           <a:extLst>
             <a:ext uri="{909E8E84-426E-40dd-AFC4-6F175D3DCCD1}">
-              <a14:hiddenFill xmlns="" xmlns:a14="http://schemas.microsoft.com/office/drawing/2010/main">
+              <a14:hiddenFill xmlns:a14="http://schemas.microsoft.com/office/drawing/2010/main" xmlns="">
                 <a:solidFill>
                   <a:srgbClr val="FFFFFF"/>
                 </a:solidFill>
               </a14:hiddenFill>
             </a:ext>
             <a:ext uri="{91240B29-F687-4f45-9708-019B960494DF}">
-              <a14:hiddenLine xmlns="" xmlns:a14="http://schemas.microsoft.com/office/drawing/2010/main" w="9525">
+              <a14:hiddenLine xmlns:a14="http://schemas.microsoft.com/office/drawing/2010/main" xmlns="" w="9525">
                 <a:solidFill>
                   <a:srgbClr val="000000"/>
                 </a:solidFill>
@@ -14350,8 +14338,25 @@
             <a:pPr lvl="1"/>
             <a:r>
               <a:rPr lang="en-US" dirty="0" smtClean="0"/>
-              <a:t>Measurable objects (return a measure)</a:t>
-            </a:r>
+              <a:t>Weighable </a:t>
+            </a:r>
+            <a:r>
+              <a:rPr lang="en-US" dirty="0" smtClean="0"/>
+              <a:t>objects (return </a:t>
+            </a:r>
+            <a:r>
+              <a:rPr lang="en-US" dirty="0" smtClean="0"/>
+              <a:t>weight in </a:t>
+            </a:r>
+            <a:r>
+              <a:rPr lang="en-US" dirty="0" err="1" smtClean="0"/>
+              <a:t>lbs</a:t>
+            </a:r>
+            <a:r>
+              <a:rPr lang="en-US" dirty="0" smtClean="0"/>
+              <a:t>)</a:t>
+            </a:r>
+            <a:endParaRPr lang="en-US" dirty="0" smtClean="0"/>
           </a:p>
           <a:p>
             <a:pPr lvl="1"/>
@@ -16059,9 +16064,16 @@
             <p:ph idx="1"/>
           </p:nvPr>
         </p:nvSpPr>
-        <p:spPr/>
-        <p:txBody>
-          <a:bodyPr/>
+        <p:spPr>
+          <a:xfrm>
+            <a:off x="228600" y="1600200"/>
+            <a:ext cx="8686800" cy="4525963"/>
+          </a:xfrm>
+        </p:spPr>
+        <p:txBody>
+          <a:bodyPr>
+            <a:normAutofit fontScale="92500"/>
+          </a:bodyPr>
           <a:lstStyle/>
           <a:p>
             <a:r>
@@ -16146,8 +16158,16 @@
               <a:t>The </a:t>
             </a:r>
             <a:r>
-              <a:rPr lang="en-US" i="1" dirty="0"/>
-              <a:t>declared type </a:t>
+              <a:rPr lang="en-US" sz="4400" i="1" u="sng" dirty="0"/>
+              <a:t>declared</a:t>
+            </a:r>
+            <a:r>
+              <a:rPr lang="en-US" sz="4800" i="1" u="sng" dirty="0"/>
+              <a:t> type</a:t>
+            </a:r>
+            <a:r>
+              <a:rPr lang="en-US" sz="4800" i="1" dirty="0"/>
+              <a:t> </a:t>
             </a:r>
             <a:r>
               <a:rPr lang="en-US" dirty="0"/>
@@ -16168,8 +16188,12 @@
               <a:t>The </a:t>
             </a:r>
             <a:r>
-              <a:rPr lang="en-US" i="1" dirty="0"/>
-              <a:t>instantiation type </a:t>
+              <a:rPr lang="en-US" sz="4400" i="1" u="sng" dirty="0"/>
+              <a:t>instantiation type</a:t>
+            </a:r>
+            <a:r>
+              <a:rPr lang="en-US" sz="4400" i="1" dirty="0"/>
+              <a:t> </a:t>
             </a:r>
             <a:r>
               <a:rPr lang="en-US" dirty="0"/>
@@ -16207,6 +16231,116 @@
             <a:pPr marL="0" indent="0">
               <a:buNone/>
             </a:pPr>
+            <a:endParaRPr lang="en-US" dirty="0"/>
+          </a:p>
+        </p:txBody>
+      </p:sp>
+      <p:sp>
+        <p:nvSpPr>
+          <p:cNvPr id="5" name="Line Callout 3 (Accent Bar) 4"/>
+          <p:cNvSpPr/>
+          <p:nvPr/>
+        </p:nvSpPr>
+        <p:spPr>
+          <a:xfrm>
+            <a:off x="401444" y="1302544"/>
+            <a:ext cx="1905000" cy="412750"/>
+          </a:xfrm>
+          <a:prstGeom prst="accentCallout3">
+            <a:avLst>
+              <a:gd name="adj1" fmla="val 10645"/>
+              <a:gd name="adj2" fmla="val -723"/>
+              <a:gd name="adj3" fmla="val 18750"/>
+              <a:gd name="adj4" fmla="val -16667"/>
+              <a:gd name="adj5" fmla="val 378856"/>
+              <a:gd name="adj6" fmla="val -1905"/>
+              <a:gd name="adj7" fmla="val 380038"/>
+              <a:gd name="adj8" fmla="val 46652"/>
+            </a:avLst>
+          </a:prstGeom>
+        </p:spPr>
+        <p:style>
+          <a:lnRef idx="2">
+            <a:schemeClr val="accent1">
+              <a:shade val="50000"/>
+            </a:schemeClr>
+          </a:lnRef>
+          <a:fillRef idx="1">
+            <a:schemeClr val="accent1"/>
+          </a:fillRef>
+          <a:effectRef idx="0">
+            <a:schemeClr val="accent1"/>
+          </a:effectRef>
+          <a:fontRef idx="minor">
+            <a:schemeClr val="lt1"/>
+          </a:fontRef>
+        </p:style>
+        <p:txBody>
+          <a:bodyPr anchor="ctr"/>
+          <a:lstStyle/>
+          <a:p>
+            <a:pPr algn="ctr">
+              <a:defRPr/>
+            </a:pPr>
+            <a:r>
+              <a:rPr lang="en-US" dirty="0" smtClean="0"/>
+              <a:t>Declared type</a:t>
+            </a:r>
+            <a:endParaRPr lang="en-US" dirty="0"/>
+          </a:p>
+        </p:txBody>
+      </p:sp>
+      <p:sp>
+        <p:nvSpPr>
+          <p:cNvPr id="6" name="Line Callout 3 (Accent Bar) 5"/>
+          <p:cNvSpPr/>
+          <p:nvPr/>
+        </p:nvSpPr>
+        <p:spPr>
+          <a:xfrm>
+            <a:off x="7086600" y="2133600"/>
+            <a:ext cx="1905000" cy="412750"/>
+          </a:xfrm>
+          <a:prstGeom prst="accentCallout3">
+            <a:avLst>
+              <a:gd name="adj1" fmla="val 70083"/>
+              <a:gd name="adj2" fmla="val 98789"/>
+              <a:gd name="adj3" fmla="val 197062"/>
+              <a:gd name="adj4" fmla="val 93967"/>
+              <a:gd name="adj5" fmla="val 227561"/>
+              <a:gd name="adj6" fmla="val 63071"/>
+              <a:gd name="adj7" fmla="val 185516"/>
+              <a:gd name="adj8" fmla="val 1578"/>
+            </a:avLst>
+          </a:prstGeom>
+        </p:spPr>
+        <p:style>
+          <a:lnRef idx="2">
+            <a:schemeClr val="accent1">
+              <a:shade val="50000"/>
+            </a:schemeClr>
+          </a:lnRef>
+          <a:fillRef idx="1">
+            <a:schemeClr val="accent1"/>
+          </a:fillRef>
+          <a:effectRef idx="0">
+            <a:schemeClr val="accent1"/>
+          </a:effectRef>
+          <a:fontRef idx="minor">
+            <a:schemeClr val="lt1"/>
+          </a:fontRef>
+        </p:style>
+        <p:txBody>
+          <a:bodyPr anchor="ctr"/>
+          <a:lstStyle/>
+          <a:p>
+            <a:pPr algn="ctr">
+              <a:defRPr/>
+            </a:pPr>
+            <a:r>
+              <a:rPr lang="en-US" dirty="0" smtClean="0"/>
+              <a:t>Instantiated type</a:t>
+            </a:r>
             <a:endParaRPr lang="en-US" dirty="0"/>
           </a:p>
         </p:txBody>
@@ -16559,14 +16693,14 @@
           </a:ln>
           <a:extLst>
             <a:ext uri="{909E8E84-426E-40dd-AFC4-6F175D3DCCD1}">
-              <a14:hiddenFill xmlns="" xmlns:a14="http://schemas.microsoft.com/office/drawing/2010/main">
+              <a14:hiddenFill xmlns:a14="http://schemas.microsoft.com/office/drawing/2010/main" xmlns="">
                 <a:solidFill>
                   <a:srgbClr val="FFFFFF"/>
                 </a:solidFill>
               </a14:hiddenFill>
             </a:ext>
             <a:ext uri="{91240B29-F687-4f45-9708-019B960494DF}">
-              <a14:hiddenLine xmlns="" xmlns:a14="http://schemas.microsoft.com/office/drawing/2010/main" w="9525">
+              <a14:hiddenLine xmlns:a14="http://schemas.microsoft.com/office/drawing/2010/main" xmlns="" w="9525">
                 <a:solidFill>
                   <a:srgbClr val="000000"/>
                 </a:solidFill>
@@ -16758,25 +16892,25 @@
           <a:p>
             <a:pPr lvl="2"/>
             <a:r>
-              <a:rPr lang="en-US" dirty="0" smtClean="0"/>
+              <a:rPr lang="en-US" b="1" dirty="0" smtClean="0"/>
               <a:t>Each list the other’s name in </a:t>
             </a:r>
             <a:r>
-              <a:rPr lang="en-US" dirty="0" err="1" smtClean="0"/>
+              <a:rPr lang="en-US" b="1" dirty="0" err="1" smtClean="0"/>
               <a:t>javadoc</a:t>
             </a:r>
             <a:r>
-              <a:rPr lang="en-US" dirty="0" smtClean="0"/>
+              <a:rPr lang="en-US" b="1" dirty="0" smtClean="0"/>
               <a:t> at top of file</a:t>
             </a:r>
           </a:p>
           <a:p>
             <a:pPr lvl="2"/>
             <a:r>
-              <a:rPr lang="en-US" dirty="0" smtClean="0"/>
+              <a:rPr lang="en-US" b="1" dirty="0" smtClean="0"/>
               <a:t>Both responsible for submitting own code</a:t>
             </a:r>
-            <a:endParaRPr lang="en-US" dirty="0"/>
+            <a:endParaRPr lang="en-US" b="1" dirty="0"/>
           </a:p>
         </p:txBody>
       </p:sp>

</xml_diff>